<commit_message>
interpreted null as 0(front end)
</commit_message>
<xml_diff>
--- a/nfa to dfa/test cases.pptx
+++ b/nfa to dfa/test cases.pptx
@@ -9,6 +9,11 @@
     <p:sldId id="259" r:id="rId3"/>
     <p:sldId id="257" r:id="rId4"/>
     <p:sldId id="258" r:id="rId5"/>
+    <p:sldId id="260" r:id="rId6"/>
+    <p:sldId id="261" r:id="rId7"/>
+    <p:sldId id="262" r:id="rId8"/>
+    <p:sldId id="263" r:id="rId9"/>
+    <p:sldId id="264" r:id="rId10"/>
   </p:sldIdLst>
   <p:sldSz cx="12192000" cy="6858000"/>
   <p:notesSz cx="6858000" cy="9144000"/>
@@ -107,6 +112,11 @@
       </a:defRPr>
     </a:lvl9pPr>
   </p:defaultTextStyle>
+  <p:extLst>
+    <p:ext uri="{EFAFB233-063F-42B5-8137-9DF3F51BA10A}">
+      <p15:sldGuideLst xmlns:p15="http://schemas.microsoft.com/office/powerpoint/2012/main"/>
+    </p:ext>
+  </p:extLst>
 </p:presentation>
 </file>
 
@@ -259,7 +269,7 @@
           <a:p>
             <a:fld id="{7CFAC15E-32F9-4BEF-9125-E9EBCEFCE890}" type="datetimeFigureOut">
               <a:rPr lang="en-IN" smtClean="0"/>
-              <a:t>05-02-2020</a:t>
+              <a:t>06-02-2020</a:t>
             </a:fld>
             <a:endParaRPr lang="en-IN"/>
           </a:p>
@@ -459,7 +469,7 @@
           <a:p>
             <a:fld id="{7CFAC15E-32F9-4BEF-9125-E9EBCEFCE890}" type="datetimeFigureOut">
               <a:rPr lang="en-IN" smtClean="0"/>
-              <a:t>05-02-2020</a:t>
+              <a:t>06-02-2020</a:t>
             </a:fld>
             <a:endParaRPr lang="en-IN"/>
           </a:p>
@@ -669,7 +679,7 @@
           <a:p>
             <a:fld id="{7CFAC15E-32F9-4BEF-9125-E9EBCEFCE890}" type="datetimeFigureOut">
               <a:rPr lang="en-IN" smtClean="0"/>
-              <a:t>05-02-2020</a:t>
+              <a:t>06-02-2020</a:t>
             </a:fld>
             <a:endParaRPr lang="en-IN"/>
           </a:p>
@@ -869,7 +879,7 @@
           <a:p>
             <a:fld id="{7CFAC15E-32F9-4BEF-9125-E9EBCEFCE890}" type="datetimeFigureOut">
               <a:rPr lang="en-IN" smtClean="0"/>
-              <a:t>05-02-2020</a:t>
+              <a:t>06-02-2020</a:t>
             </a:fld>
             <a:endParaRPr lang="en-IN"/>
           </a:p>
@@ -1145,7 +1155,7 @@
           <a:p>
             <a:fld id="{7CFAC15E-32F9-4BEF-9125-E9EBCEFCE890}" type="datetimeFigureOut">
               <a:rPr lang="en-IN" smtClean="0"/>
-              <a:t>05-02-2020</a:t>
+              <a:t>06-02-2020</a:t>
             </a:fld>
             <a:endParaRPr lang="en-IN"/>
           </a:p>
@@ -1413,7 +1423,7 @@
           <a:p>
             <a:fld id="{7CFAC15E-32F9-4BEF-9125-E9EBCEFCE890}" type="datetimeFigureOut">
               <a:rPr lang="en-IN" smtClean="0"/>
-              <a:t>05-02-2020</a:t>
+              <a:t>06-02-2020</a:t>
             </a:fld>
             <a:endParaRPr lang="en-IN"/>
           </a:p>
@@ -1828,7 +1838,7 @@
           <a:p>
             <a:fld id="{7CFAC15E-32F9-4BEF-9125-E9EBCEFCE890}" type="datetimeFigureOut">
               <a:rPr lang="en-IN" smtClean="0"/>
-              <a:t>05-02-2020</a:t>
+              <a:t>06-02-2020</a:t>
             </a:fld>
             <a:endParaRPr lang="en-IN"/>
           </a:p>
@@ -1970,7 +1980,7 @@
           <a:p>
             <a:fld id="{7CFAC15E-32F9-4BEF-9125-E9EBCEFCE890}" type="datetimeFigureOut">
               <a:rPr lang="en-IN" smtClean="0"/>
-              <a:t>05-02-2020</a:t>
+              <a:t>06-02-2020</a:t>
             </a:fld>
             <a:endParaRPr lang="en-IN"/>
           </a:p>
@@ -2083,7 +2093,7 @@
           <a:p>
             <a:fld id="{7CFAC15E-32F9-4BEF-9125-E9EBCEFCE890}" type="datetimeFigureOut">
               <a:rPr lang="en-IN" smtClean="0"/>
-              <a:t>05-02-2020</a:t>
+              <a:t>06-02-2020</a:t>
             </a:fld>
             <a:endParaRPr lang="en-IN"/>
           </a:p>
@@ -2396,7 +2406,7 @@
           <a:p>
             <a:fld id="{7CFAC15E-32F9-4BEF-9125-E9EBCEFCE890}" type="datetimeFigureOut">
               <a:rPr lang="en-IN" smtClean="0"/>
-              <a:t>05-02-2020</a:t>
+              <a:t>06-02-2020</a:t>
             </a:fld>
             <a:endParaRPr lang="en-IN"/>
           </a:p>
@@ -2685,7 +2695,7 @@
           <a:p>
             <a:fld id="{7CFAC15E-32F9-4BEF-9125-E9EBCEFCE890}" type="datetimeFigureOut">
               <a:rPr lang="en-IN" smtClean="0"/>
-              <a:t>05-02-2020</a:t>
+              <a:t>06-02-2020</a:t>
             </a:fld>
             <a:endParaRPr lang="en-IN"/>
           </a:p>
@@ -2928,7 +2938,7 @@
           <a:p>
             <a:fld id="{7CFAC15E-32F9-4BEF-9125-E9EBCEFCE890}" type="datetimeFigureOut">
               <a:rPr lang="en-IN" smtClean="0"/>
-              <a:t>05-02-2020</a:t>
+              <a:t>06-02-2020</a:t>
             </a:fld>
             <a:endParaRPr lang="en-IN"/>
           </a:p>
@@ -5994,6 +6004,759 @@
 </p:sld>
 </file>
 
+<file path=ppt/slides/slide5.xml><?xml version="1.0" encoding="utf-8"?>
+<p:sld xmlns:a="http://schemas.openxmlformats.org/drawingml/2006/main" xmlns:r="http://schemas.openxmlformats.org/officeDocument/2006/relationships" xmlns:p="http://schemas.openxmlformats.org/presentationml/2006/main">
+  <p:cSld>
+    <p:spTree>
+      <p:nvGrpSpPr>
+        <p:cNvPr id="1" name=""/>
+        <p:cNvGrpSpPr/>
+        <p:nvPr/>
+      </p:nvGrpSpPr>
+      <p:grpSpPr>
+        <a:xfrm>
+          <a:off x="0" y="0"/>
+          <a:ext cx="0" cy="0"/>
+          <a:chOff x="0" y="0"/>
+          <a:chExt cx="0" cy="0"/>
+        </a:xfrm>
+      </p:grpSpPr>
+      <p:sp>
+        <p:nvSpPr>
+          <p:cNvPr id="2" name="Title 1">
+            <a:extLst>
+              <a:ext uri="{FF2B5EF4-FFF2-40B4-BE49-F238E27FC236}">
+                <a16:creationId xmlns:a16="http://schemas.microsoft.com/office/drawing/2014/main" id="{A83F3BE5-8279-4B3E-8117-2D1832AB1FF3}"/>
+              </a:ext>
+            </a:extLst>
+          </p:cNvPr>
+          <p:cNvSpPr>
+            <a:spLocks noGrp="1"/>
+          </p:cNvSpPr>
+          <p:nvPr>
+            <p:ph type="title"/>
+          </p:nvPr>
+        </p:nvSpPr>
+        <p:spPr/>
+        <p:txBody>
+          <a:bodyPr/>
+          <a:lstStyle/>
+          <a:p>
+            <a:r>
+              <a:rPr lang="en-IN" dirty="0"/>
+              <a:t>Reference for you:</a:t>
+            </a:r>
+          </a:p>
+        </p:txBody>
+      </p:sp>
+      <p:sp>
+        <p:nvSpPr>
+          <p:cNvPr id="3" name="Content Placeholder 2">
+            <a:extLst>
+              <a:ext uri="{FF2B5EF4-FFF2-40B4-BE49-F238E27FC236}">
+                <a16:creationId xmlns:a16="http://schemas.microsoft.com/office/drawing/2014/main" id="{C830D6B6-4273-465B-A5B6-7558B3E335F2}"/>
+              </a:ext>
+            </a:extLst>
+          </p:cNvPr>
+          <p:cNvSpPr>
+            <a:spLocks noGrp="1"/>
+          </p:cNvSpPr>
+          <p:nvPr>
+            <p:ph idx="1"/>
+          </p:nvPr>
+        </p:nvSpPr>
+        <p:spPr/>
+        <p:txBody>
+          <a:bodyPr/>
+          <a:lstStyle/>
+          <a:p>
+            <a:pPr marL="0" indent="0">
+              <a:buNone/>
+            </a:pPr>
+            <a:r>
+              <a:rPr lang="en-IN" dirty="0"/>
+              <a:t>C++ code:</a:t>
+            </a:r>
+          </a:p>
+          <a:p>
+            <a:pPr marL="0" indent="0">
+              <a:buNone/>
+            </a:pPr>
+            <a:r>
+              <a:rPr lang="en-IN" dirty="0">
+                <a:hlinkClick r:id="rId2"/>
+              </a:rPr>
+              <a:t>https://github.com/DhavalDDT/sd/tree/master/nfa%20to%20dfa</a:t>
+            </a:r>
+            <a:endParaRPr lang="en-IN" dirty="0"/>
+          </a:p>
+          <a:p>
+            <a:pPr marL="0" indent="0">
+              <a:buNone/>
+            </a:pPr>
+            <a:r>
+              <a:rPr lang="en-IN" dirty="0"/>
+              <a:t>Python code:</a:t>
+            </a:r>
+          </a:p>
+          <a:p>
+            <a:pPr marL="0" indent="0">
+              <a:buNone/>
+            </a:pPr>
+            <a:r>
+              <a:rPr lang="en-IN" dirty="0">
+                <a:hlinkClick r:id="rId3"/>
+              </a:rPr>
+              <a:t>https://github.com/abhishekkale047/Theory-Of-Computation/blob/master/NFA%20To%20DFA</a:t>
+            </a:r>
+            <a:endParaRPr lang="en-IN" dirty="0"/>
+          </a:p>
+        </p:txBody>
+      </p:sp>
+    </p:spTree>
+    <p:extLst>
+      <p:ext uri="{BB962C8B-B14F-4D97-AF65-F5344CB8AC3E}">
+        <p14:creationId xmlns:p14="http://schemas.microsoft.com/office/powerpoint/2010/main" val="387950119"/>
+      </p:ext>
+    </p:extLst>
+  </p:cSld>
+  <p:clrMapOvr>
+    <a:masterClrMapping/>
+  </p:clrMapOvr>
+</p:sld>
+</file>
+
+<file path=ppt/slides/slide6.xml><?xml version="1.0" encoding="utf-8"?>
+<p:sld xmlns:a="http://schemas.openxmlformats.org/drawingml/2006/main" xmlns:r="http://schemas.openxmlformats.org/officeDocument/2006/relationships" xmlns:p="http://schemas.openxmlformats.org/presentationml/2006/main">
+  <p:cSld>
+    <p:spTree>
+      <p:nvGrpSpPr>
+        <p:cNvPr id="1" name=""/>
+        <p:cNvGrpSpPr/>
+        <p:nvPr/>
+      </p:nvGrpSpPr>
+      <p:grpSpPr>
+        <a:xfrm>
+          <a:off x="0" y="0"/>
+          <a:ext cx="0" cy="0"/>
+          <a:chOff x="0" y="0"/>
+          <a:chExt cx="0" cy="0"/>
+        </a:xfrm>
+      </p:grpSpPr>
+      <p:sp>
+        <p:nvSpPr>
+          <p:cNvPr id="2" name="Title 1">
+            <a:extLst>
+              <a:ext uri="{FF2B5EF4-FFF2-40B4-BE49-F238E27FC236}">
+                <a16:creationId xmlns:a16="http://schemas.microsoft.com/office/drawing/2014/main" id="{3B583FCA-53D5-46B3-994E-896D75F52ADF}"/>
+              </a:ext>
+            </a:extLst>
+          </p:cNvPr>
+          <p:cNvSpPr>
+            <a:spLocks noGrp="1"/>
+          </p:cNvSpPr>
+          <p:nvPr>
+            <p:ph type="title"/>
+          </p:nvPr>
+        </p:nvSpPr>
+        <p:spPr/>
+        <p:txBody>
+          <a:bodyPr/>
+          <a:lstStyle/>
+          <a:p>
+            <a:endParaRPr lang="en-IN"/>
+          </a:p>
+        </p:txBody>
+      </p:sp>
+      <p:sp>
+        <p:nvSpPr>
+          <p:cNvPr id="3" name="Content Placeholder 2">
+            <a:extLst>
+              <a:ext uri="{FF2B5EF4-FFF2-40B4-BE49-F238E27FC236}">
+                <a16:creationId xmlns:a16="http://schemas.microsoft.com/office/drawing/2014/main" id="{8CFD2F12-EB97-464C-BDCB-024A00F2C7BD}"/>
+              </a:ext>
+            </a:extLst>
+          </p:cNvPr>
+          <p:cNvSpPr>
+            <a:spLocks noGrp="1"/>
+          </p:cNvSpPr>
+          <p:nvPr>
+            <p:ph idx="1"/>
+          </p:nvPr>
+        </p:nvSpPr>
+        <p:spPr>
+          <a:xfrm>
+            <a:off x="838200" y="365125"/>
+            <a:ext cx="10515600" cy="5811838"/>
+          </a:xfrm>
+        </p:spPr>
+        <p:txBody>
+          <a:bodyPr>
+            <a:normAutofit fontScale="85000" lnSpcReduction="10000"/>
+          </a:bodyPr>
+          <a:lstStyle/>
+          <a:p>
+            <a:r>
+              <a:rPr lang="en-IN" dirty="0"/>
+              <a:t>Enter the total number of states: 2</a:t>
+            </a:r>
+          </a:p>
+          <a:p>
+            <a:r>
+              <a:rPr lang="en-IN" dirty="0"/>
+              <a:t>State 0 is considered as initial state</a:t>
+            </a:r>
+          </a:p>
+          <a:p>
+            <a:r>
+              <a:rPr lang="en-IN" dirty="0"/>
+              <a:t>Enter the final state: 1</a:t>
+            </a:r>
+          </a:p>
+          <a:p>
+            <a:r>
+              <a:rPr lang="en-IN" dirty="0"/>
+              <a:t>For state 0:</a:t>
+            </a:r>
+          </a:p>
+          <a:p>
+            <a:r>
+              <a:rPr lang="en-IN" dirty="0"/>
+              <a:t>Enter the number of possible transitions for 0(for null, no of transitions is 1): 2</a:t>
+            </a:r>
+          </a:p>
+          <a:p>
+            <a:r>
+              <a:rPr lang="en-IN" dirty="0"/>
+              <a:t>Enter states that can be traversed at occurrence of 0(for null enter -1): 0</a:t>
+            </a:r>
+          </a:p>
+          <a:p>
+            <a:r>
+              <a:rPr lang="en-IN" dirty="0"/>
+              <a:t>1</a:t>
+            </a:r>
+          </a:p>
+          <a:p>
+            <a:r>
+              <a:rPr lang="en-IN" dirty="0"/>
+              <a:t>Enter the number of possible transitions for 1(for null, no of transitions is 1): 1</a:t>
+            </a:r>
+          </a:p>
+          <a:p>
+            <a:r>
+              <a:rPr lang="en-IN" dirty="0"/>
+              <a:t>Enter states that can be traversed at occurrence of 1(for null enter -1): 0</a:t>
+            </a:r>
+          </a:p>
+          <a:p>
+            <a:r>
+              <a:rPr lang="en-IN" dirty="0"/>
+              <a:t>For state 1:</a:t>
+            </a:r>
+          </a:p>
+          <a:p>
+            <a:r>
+              <a:rPr lang="en-IN" dirty="0"/>
+              <a:t>Enter the number of possible transitions for 0(for null, no of transitions is 1): 1</a:t>
+            </a:r>
+          </a:p>
+          <a:p>
+            <a:r>
+              <a:rPr lang="en-IN" dirty="0"/>
+              <a:t>Enter states that can be traversed at occurrence of 0(for null enter -1): -1</a:t>
+            </a:r>
+          </a:p>
+          <a:p>
+            <a:r>
+              <a:rPr lang="en-IN" dirty="0"/>
+              <a:t>Enter the number of possible transitions for 1(for null, no of transitions is 1): 1-1</a:t>
+            </a:r>
+          </a:p>
+          <a:p>
+            <a:endParaRPr lang="en-IN" dirty="0"/>
+          </a:p>
+        </p:txBody>
+      </p:sp>
+    </p:spTree>
+    <p:extLst>
+      <p:ext uri="{BB962C8B-B14F-4D97-AF65-F5344CB8AC3E}">
+        <p14:creationId xmlns:p14="http://schemas.microsoft.com/office/powerpoint/2010/main" val="3082328996"/>
+      </p:ext>
+    </p:extLst>
+  </p:cSld>
+  <p:clrMapOvr>
+    <a:masterClrMapping/>
+  </p:clrMapOvr>
+</p:sld>
+</file>
+
+<file path=ppt/slides/slide7.xml><?xml version="1.0" encoding="utf-8"?>
+<p:sld xmlns:a="http://schemas.openxmlformats.org/drawingml/2006/main" xmlns:r="http://schemas.openxmlformats.org/officeDocument/2006/relationships" xmlns:p="http://schemas.openxmlformats.org/presentationml/2006/main">
+  <p:cSld>
+    <p:spTree>
+      <p:nvGrpSpPr>
+        <p:cNvPr id="1" name=""/>
+        <p:cNvGrpSpPr/>
+        <p:nvPr/>
+      </p:nvGrpSpPr>
+      <p:grpSpPr>
+        <a:xfrm>
+          <a:off x="0" y="0"/>
+          <a:ext cx="0" cy="0"/>
+          <a:chOff x="0" y="0"/>
+          <a:chExt cx="0" cy="0"/>
+        </a:xfrm>
+      </p:grpSpPr>
+      <p:sp>
+        <p:nvSpPr>
+          <p:cNvPr id="2" name="Title 1">
+            <a:extLst>
+              <a:ext uri="{FF2B5EF4-FFF2-40B4-BE49-F238E27FC236}">
+                <a16:creationId xmlns:a16="http://schemas.microsoft.com/office/drawing/2014/main" id="{9D05A945-B8E1-48B2-8303-3D08FBA252F8}"/>
+              </a:ext>
+            </a:extLst>
+          </p:cNvPr>
+          <p:cNvSpPr>
+            <a:spLocks noGrp="1"/>
+          </p:cNvSpPr>
+          <p:nvPr>
+            <p:ph type="title"/>
+          </p:nvPr>
+        </p:nvSpPr>
+        <p:spPr/>
+        <p:txBody>
+          <a:bodyPr/>
+          <a:lstStyle/>
+          <a:p>
+            <a:endParaRPr lang="en-IN"/>
+          </a:p>
+        </p:txBody>
+      </p:sp>
+      <p:sp>
+        <p:nvSpPr>
+          <p:cNvPr id="3" name="Content Placeholder 2">
+            <a:extLst>
+              <a:ext uri="{FF2B5EF4-FFF2-40B4-BE49-F238E27FC236}">
+                <a16:creationId xmlns:a16="http://schemas.microsoft.com/office/drawing/2014/main" id="{5B9A38C9-8EC7-40ED-AA20-8EBC2F7DAEBB}"/>
+              </a:ext>
+            </a:extLst>
+          </p:cNvPr>
+          <p:cNvSpPr>
+            <a:spLocks noGrp="1"/>
+          </p:cNvSpPr>
+          <p:nvPr>
+            <p:ph idx="1"/>
+          </p:nvPr>
+        </p:nvSpPr>
+        <p:spPr/>
+        <p:txBody>
+          <a:bodyPr>
+            <a:normAutofit fontScale="92500" lnSpcReduction="10000"/>
+          </a:bodyPr>
+          <a:lstStyle/>
+          <a:p>
+            <a:r>
+              <a:rPr lang="en-IN" dirty="0"/>
+              <a:t>Enter states that can be traversed at occurrence of 1(for null enter -1): Entered </a:t>
+            </a:r>
+            <a:r>
+              <a:rPr lang="en-IN" dirty="0" err="1"/>
+              <a:t>nfa</a:t>
+            </a:r>
+            <a:r>
+              <a:rPr lang="en-IN" dirty="0"/>
+              <a:t> is as follows:</a:t>
+            </a:r>
+          </a:p>
+          <a:p>
+            <a:r>
+              <a:rPr lang="en-IN" dirty="0"/>
+              <a:t>States  0       1</a:t>
+            </a:r>
+          </a:p>
+          <a:p>
+            <a:r>
+              <a:rPr lang="en-IN" dirty="0"/>
+              <a:t>{ 0 }   { 0,1 } { 0 }</a:t>
+            </a:r>
+          </a:p>
+          <a:p>
+            <a:r>
+              <a:rPr lang="en-IN" dirty="0"/>
+              <a:t>*{ 1 }  { - }   { - }</a:t>
+            </a:r>
+          </a:p>
+          <a:p>
+            <a:endParaRPr lang="en-IN" dirty="0"/>
+          </a:p>
+          <a:p>
+            <a:r>
+              <a:rPr lang="en-IN" dirty="0"/>
+              <a:t>The corresponding </a:t>
+            </a:r>
+            <a:r>
+              <a:rPr lang="en-IN" dirty="0" err="1"/>
+              <a:t>dfa</a:t>
+            </a:r>
+            <a:r>
+              <a:rPr lang="en-IN" dirty="0"/>
+              <a:t> is as follows(-1 represents rejections state):</a:t>
+            </a:r>
+          </a:p>
+          <a:p>
+            <a:r>
+              <a:rPr lang="en-IN" dirty="0"/>
+              <a:t>States  0       1</a:t>
+            </a:r>
+          </a:p>
+          <a:p>
+            <a:r>
+              <a:rPr lang="en-IN" dirty="0"/>
+              <a:t>0       01      0</a:t>
+            </a:r>
+          </a:p>
+          <a:p>
+            <a:r>
+              <a:rPr lang="en-IN" dirty="0"/>
+              <a:t>*01     01      0</a:t>
+            </a:r>
+          </a:p>
+        </p:txBody>
+      </p:sp>
+    </p:spTree>
+    <p:extLst>
+      <p:ext uri="{BB962C8B-B14F-4D97-AF65-F5344CB8AC3E}">
+        <p14:creationId xmlns:p14="http://schemas.microsoft.com/office/powerpoint/2010/main" val="646483675"/>
+      </p:ext>
+    </p:extLst>
+  </p:cSld>
+  <p:clrMapOvr>
+    <a:masterClrMapping/>
+  </p:clrMapOvr>
+</p:sld>
+</file>
+
+<file path=ppt/slides/slide8.xml><?xml version="1.0" encoding="utf-8"?>
+<p:sld xmlns:a="http://schemas.openxmlformats.org/drawingml/2006/main" xmlns:r="http://schemas.openxmlformats.org/officeDocument/2006/relationships" xmlns:p="http://schemas.openxmlformats.org/presentationml/2006/main">
+  <p:cSld>
+    <p:spTree>
+      <p:nvGrpSpPr>
+        <p:cNvPr id="1" name=""/>
+        <p:cNvGrpSpPr/>
+        <p:nvPr/>
+      </p:nvGrpSpPr>
+      <p:grpSpPr>
+        <a:xfrm>
+          <a:off x="0" y="0"/>
+          <a:ext cx="0" cy="0"/>
+          <a:chOff x="0" y="0"/>
+          <a:chExt cx="0" cy="0"/>
+        </a:xfrm>
+      </p:grpSpPr>
+      <p:sp>
+        <p:nvSpPr>
+          <p:cNvPr id="2" name="Title 1">
+            <a:extLst>
+              <a:ext uri="{FF2B5EF4-FFF2-40B4-BE49-F238E27FC236}">
+                <a16:creationId xmlns:a16="http://schemas.microsoft.com/office/drawing/2014/main" id="{E9F8A9F4-0D30-4AFA-B1FB-DD5F2E4FB71F}"/>
+              </a:ext>
+            </a:extLst>
+          </p:cNvPr>
+          <p:cNvSpPr>
+            <a:spLocks noGrp="1"/>
+          </p:cNvSpPr>
+          <p:nvPr>
+            <p:ph type="title"/>
+          </p:nvPr>
+        </p:nvSpPr>
+        <p:spPr/>
+        <p:txBody>
+          <a:bodyPr/>
+          <a:lstStyle/>
+          <a:p>
+            <a:endParaRPr lang="en-IN"/>
+          </a:p>
+        </p:txBody>
+      </p:sp>
+      <p:sp>
+        <p:nvSpPr>
+          <p:cNvPr id="3" name="Content Placeholder 2">
+            <a:extLst>
+              <a:ext uri="{FF2B5EF4-FFF2-40B4-BE49-F238E27FC236}">
+                <a16:creationId xmlns:a16="http://schemas.microsoft.com/office/drawing/2014/main" id="{0F7C27AD-4753-43D5-BA51-64B31993AFDC}"/>
+              </a:ext>
+            </a:extLst>
+          </p:cNvPr>
+          <p:cNvSpPr>
+            <a:spLocks noGrp="1"/>
+          </p:cNvSpPr>
+          <p:nvPr>
+            <p:ph idx="1"/>
+          </p:nvPr>
+        </p:nvSpPr>
+        <p:spPr>
+          <a:xfrm>
+            <a:off x="838200" y="98612"/>
+            <a:ext cx="10515600" cy="6078351"/>
+          </a:xfrm>
+        </p:spPr>
+        <p:txBody>
+          <a:bodyPr>
+            <a:normAutofit fontScale="85000" lnSpcReduction="10000"/>
+          </a:bodyPr>
+          <a:lstStyle/>
+          <a:p>
+            <a:r>
+              <a:rPr lang="en-IN" dirty="0"/>
+              <a:t>Enter the total number of states: 2</a:t>
+            </a:r>
+          </a:p>
+          <a:p>
+            <a:r>
+              <a:rPr lang="en-IN" dirty="0"/>
+              <a:t>State 0 is considered as initial state</a:t>
+            </a:r>
+          </a:p>
+          <a:p>
+            <a:r>
+              <a:rPr lang="en-IN" dirty="0"/>
+              <a:t>Enter the final state: 1</a:t>
+            </a:r>
+          </a:p>
+          <a:p>
+            <a:r>
+              <a:rPr lang="en-IN" dirty="0"/>
+              <a:t>For state 0:</a:t>
+            </a:r>
+          </a:p>
+          <a:p>
+            <a:r>
+              <a:rPr lang="en-IN" dirty="0"/>
+              <a:t>Enter the number of possible transitions for 0(for null, no of transitions is 1): 1</a:t>
+            </a:r>
+          </a:p>
+          <a:p>
+            <a:r>
+              <a:rPr lang="en-IN" dirty="0"/>
+              <a:t>Enter states that can be traversed at occurrence of 0(for null enter -1): 1</a:t>
+            </a:r>
+          </a:p>
+          <a:p>
+            <a:r>
+              <a:rPr lang="en-IN" dirty="0"/>
+              <a:t>Enter the number of possible transitions for 1(for null, no of transitions is 1): 1</a:t>
+            </a:r>
+          </a:p>
+          <a:p>
+            <a:r>
+              <a:rPr lang="en-IN" dirty="0"/>
+              <a:t>Enter states that can be traversed at occurrence of 1(for null enter -1): -1</a:t>
+            </a:r>
+          </a:p>
+          <a:p>
+            <a:r>
+              <a:rPr lang="en-IN" dirty="0"/>
+              <a:t>For state 1:</a:t>
+            </a:r>
+          </a:p>
+          <a:p>
+            <a:r>
+              <a:rPr lang="en-IN" dirty="0"/>
+              <a:t>Enter the number of possible transitions for 0(for null, no of transitions is 1): 1</a:t>
+            </a:r>
+          </a:p>
+          <a:p>
+            <a:r>
+              <a:rPr lang="en-IN" dirty="0"/>
+              <a:t>Enter states that can be traversed at occurrence of 0(for null enter -1): 1</a:t>
+            </a:r>
+          </a:p>
+          <a:p>
+            <a:r>
+              <a:rPr lang="en-IN" dirty="0"/>
+              <a:t>Enter the number of possible transitions for 1(for null, no of transitions is 1): 1</a:t>
+            </a:r>
+          </a:p>
+          <a:p>
+            <a:r>
+              <a:rPr lang="en-IN" dirty="0"/>
+              <a:t>Enter states that can be traversed at occurrence of 1(for null enter -1): 1</a:t>
+            </a:r>
+          </a:p>
+          <a:p>
+            <a:endParaRPr lang="en-IN" dirty="0"/>
+          </a:p>
+        </p:txBody>
+      </p:sp>
+    </p:spTree>
+    <p:extLst>
+      <p:ext uri="{BB962C8B-B14F-4D97-AF65-F5344CB8AC3E}">
+        <p14:creationId xmlns:p14="http://schemas.microsoft.com/office/powerpoint/2010/main" val="3981664965"/>
+      </p:ext>
+    </p:extLst>
+  </p:cSld>
+  <p:clrMapOvr>
+    <a:masterClrMapping/>
+  </p:clrMapOvr>
+</p:sld>
+</file>
+
+<file path=ppt/slides/slide9.xml><?xml version="1.0" encoding="utf-8"?>
+<p:sld xmlns:a="http://schemas.openxmlformats.org/drawingml/2006/main" xmlns:r="http://schemas.openxmlformats.org/officeDocument/2006/relationships" xmlns:p="http://schemas.openxmlformats.org/presentationml/2006/main">
+  <p:cSld>
+    <p:spTree>
+      <p:nvGrpSpPr>
+        <p:cNvPr id="1" name=""/>
+        <p:cNvGrpSpPr/>
+        <p:nvPr/>
+      </p:nvGrpSpPr>
+      <p:grpSpPr>
+        <a:xfrm>
+          <a:off x="0" y="0"/>
+          <a:ext cx="0" cy="0"/>
+          <a:chOff x="0" y="0"/>
+          <a:chExt cx="0" cy="0"/>
+        </a:xfrm>
+      </p:grpSpPr>
+      <p:sp>
+        <p:nvSpPr>
+          <p:cNvPr id="2" name="Title 1">
+            <a:extLst>
+              <a:ext uri="{FF2B5EF4-FFF2-40B4-BE49-F238E27FC236}">
+                <a16:creationId xmlns:a16="http://schemas.microsoft.com/office/drawing/2014/main" id="{A2118429-0EDA-4721-B38D-55C4E8BD4679}"/>
+              </a:ext>
+            </a:extLst>
+          </p:cNvPr>
+          <p:cNvSpPr>
+            <a:spLocks noGrp="1"/>
+          </p:cNvSpPr>
+          <p:nvPr>
+            <p:ph type="title"/>
+          </p:nvPr>
+        </p:nvSpPr>
+        <p:spPr/>
+        <p:txBody>
+          <a:bodyPr/>
+          <a:lstStyle/>
+          <a:p>
+            <a:endParaRPr lang="en-IN"/>
+          </a:p>
+        </p:txBody>
+      </p:sp>
+      <p:sp>
+        <p:nvSpPr>
+          <p:cNvPr id="3" name="Content Placeholder 2">
+            <a:extLst>
+              <a:ext uri="{FF2B5EF4-FFF2-40B4-BE49-F238E27FC236}">
+                <a16:creationId xmlns:a16="http://schemas.microsoft.com/office/drawing/2014/main" id="{E61B1653-9905-4C06-A094-42D18232C29B}"/>
+              </a:ext>
+            </a:extLst>
+          </p:cNvPr>
+          <p:cNvSpPr>
+            <a:spLocks noGrp="1"/>
+          </p:cNvSpPr>
+          <p:nvPr>
+            <p:ph idx="1"/>
+          </p:nvPr>
+        </p:nvSpPr>
+        <p:spPr/>
+        <p:txBody>
+          <a:bodyPr>
+            <a:normAutofit fontScale="92500" lnSpcReduction="20000"/>
+          </a:bodyPr>
+          <a:lstStyle/>
+          <a:p>
+            <a:r>
+              <a:rPr lang="en-IN" dirty="0"/>
+              <a:t>Entered </a:t>
+            </a:r>
+            <a:r>
+              <a:rPr lang="en-IN" dirty="0" err="1"/>
+              <a:t>nfa</a:t>
+            </a:r>
+            <a:r>
+              <a:rPr lang="en-IN" dirty="0"/>
+              <a:t> is as follows:</a:t>
+            </a:r>
+          </a:p>
+          <a:p>
+            <a:r>
+              <a:rPr lang="en-IN" dirty="0"/>
+              <a:t>States  0       1</a:t>
+            </a:r>
+          </a:p>
+          <a:p>
+            <a:r>
+              <a:rPr lang="en-IN" dirty="0"/>
+              <a:t>{ 0 }   { 1 }   { - }</a:t>
+            </a:r>
+          </a:p>
+          <a:p>
+            <a:r>
+              <a:rPr lang="en-IN" dirty="0"/>
+              <a:t>*{ 1 }  { 1 }   { 1 }</a:t>
+            </a:r>
+          </a:p>
+          <a:p>
+            <a:endParaRPr lang="en-IN" dirty="0"/>
+          </a:p>
+          <a:p>
+            <a:r>
+              <a:rPr lang="en-IN" dirty="0"/>
+              <a:t>The corresponding </a:t>
+            </a:r>
+            <a:r>
+              <a:rPr lang="en-IN" dirty="0" err="1"/>
+              <a:t>dfa</a:t>
+            </a:r>
+            <a:r>
+              <a:rPr lang="en-IN" dirty="0"/>
+              <a:t> is as follows(-1 represents rejections state):</a:t>
+            </a:r>
+          </a:p>
+          <a:p>
+            <a:r>
+              <a:rPr lang="en-IN" dirty="0"/>
+              <a:t>States  0       1</a:t>
+            </a:r>
+          </a:p>
+          <a:p>
+            <a:r>
+              <a:rPr lang="en-IN" dirty="0"/>
+              <a:t>0       1       -1</a:t>
+            </a:r>
+          </a:p>
+          <a:p>
+            <a:r>
+              <a:rPr lang="en-IN" dirty="0"/>
+              <a:t>*1      1       1</a:t>
+            </a:r>
+          </a:p>
+          <a:p>
+            <a:r>
+              <a:rPr lang="en-IN" dirty="0"/>
+              <a:t>-1      -1      -1</a:t>
+            </a:r>
+          </a:p>
+          <a:p>
+            <a:endParaRPr lang="en-IN" dirty="0"/>
+          </a:p>
+        </p:txBody>
+      </p:sp>
+    </p:spTree>
+    <p:extLst>
+      <p:ext uri="{BB962C8B-B14F-4D97-AF65-F5344CB8AC3E}">
+        <p14:creationId xmlns:p14="http://schemas.microsoft.com/office/powerpoint/2010/main" val="513894968"/>
+      </p:ext>
+    </p:extLst>
+  </p:cSld>
+  <p:clrMapOvr>
+    <a:masterClrMapping/>
+  </p:clrMapOvr>
+</p:sld>
+</file>
+
 <file path=ppt/theme/theme1.xml><?xml version="1.0" encoding="utf-8"?>
 <a:theme xmlns:a="http://schemas.openxmlformats.org/drawingml/2006/main" name="Office Theme">
   <a:themeElements>

</xml_diff>